<commit_message>
Web and sql presentation@
</commit_message>
<xml_diff>
--- a/Web and SQL.pptx
+++ b/Web and SQL.pptx
@@ -1207,6 +1207,187 @@
     <p:extLst>
       <p:ext uri="{BB962C8B-B14F-4D97-AF65-F5344CB8AC3E}">
         <p14:creationId xmlns:p14="http://schemas.microsoft.com/office/powerpoint/2010/main" val="2237130354"/>
+      </p:ext>
+    </p:extLst>
+  </p:cSld>
+  <p:clrMapOvr>
+    <a:masterClrMapping/>
+  </p:clrMapOvr>
+</p:notes>
+</file>
+
+<file path=ppt/notesSlides/notesSlide3.xml><?xml version="1.0" encoding="utf-8"?>
+<p:notes xmlns:a="http://schemas.openxmlformats.org/drawingml/2006/main" xmlns:r="http://schemas.openxmlformats.org/officeDocument/2006/relationships" xmlns:p="http://schemas.openxmlformats.org/presentationml/2006/main">
+  <p:cSld>
+    <p:spTree>
+      <p:nvGrpSpPr>
+        <p:cNvPr id="1" name=""/>
+        <p:cNvGrpSpPr/>
+        <p:nvPr/>
+      </p:nvGrpSpPr>
+      <p:grpSpPr>
+        <a:xfrm>
+          <a:off x="0" y="0"/>
+          <a:ext cx="0" cy="0"/>
+          <a:chOff x="0" y="0"/>
+          <a:chExt cx="0" cy="0"/>
+        </a:xfrm>
+      </p:grpSpPr>
+      <p:sp>
+        <p:nvSpPr>
+          <p:cNvPr id="2" name="Slide Image Placeholder 1"/>
+          <p:cNvSpPr>
+            <a:spLocks noGrp="1" noRot="1" noChangeAspect="1"/>
+          </p:cNvSpPr>
+          <p:nvPr>
+            <p:ph type="sldImg"/>
+          </p:nvPr>
+        </p:nvSpPr>
+        <p:spPr/>
+      </p:sp>
+      <p:sp>
+        <p:nvSpPr>
+          <p:cNvPr id="3" name="Notes Placeholder 2"/>
+          <p:cNvSpPr>
+            <a:spLocks noGrp="1"/>
+          </p:cNvSpPr>
+          <p:nvPr>
+            <p:ph type="body" idx="1"/>
+          </p:nvPr>
+        </p:nvSpPr>
+        <p:spPr/>
+        <p:txBody>
+          <a:bodyPr/>
+          <a:lstStyle/>
+          <a:p>
+            <a:endParaRPr lang="en-US" dirty="0"/>
+          </a:p>
+        </p:txBody>
+      </p:sp>
+      <p:sp>
+        <p:nvSpPr>
+          <p:cNvPr id="4" name="Header Placeholder 3"/>
+          <p:cNvSpPr>
+            <a:spLocks noGrp="1"/>
+          </p:cNvSpPr>
+          <p:nvPr>
+            <p:ph type="hdr" sz="quarter" idx="10"/>
+          </p:nvPr>
+        </p:nvSpPr>
+        <p:spPr/>
+        <p:txBody>
+          <a:bodyPr/>
+          <a:lstStyle/>
+          <a:p>
+            <a:endParaRPr lang="en-US" dirty="0"/>
+          </a:p>
+        </p:txBody>
+      </p:sp>
+      <p:sp>
+        <p:nvSpPr>
+          <p:cNvPr id="5" name="Footer Placeholder 4"/>
+          <p:cNvSpPr>
+            <a:spLocks noGrp="1"/>
+          </p:cNvSpPr>
+          <p:nvPr>
+            <p:ph type="ftr" sz="quarter" idx="11"/>
+          </p:nvPr>
+        </p:nvSpPr>
+        <p:spPr/>
+        <p:txBody>
+          <a:bodyPr/>
+          <a:lstStyle/>
+          <a:p>
+            <a:pPr defTabSz="914099" eaLnBrk="0" hangingPunct="0"/>
+            <a:r>
+              <a:rPr lang="en-US" sz="400">
+                <a:gradFill>
+                  <a:gsLst>
+                    <a:gs pos="0">
+                      <a:prstClr val="black"/>
+                    </a:gs>
+                    <a:gs pos="100000">
+                      <a:prstClr val="black"/>
+                    </a:gs>
+                  </a:gsLst>
+                  <a:lin ang="5400000" scaled="0"/>
+                </a:gradFill>
+                <a:latin typeface="Segoe UI" pitchFamily="34" charset="0"/>
+                <a:ea typeface="Segoe UI" pitchFamily="34" charset="0"/>
+                <a:cs typeface="Segoe UI" pitchFamily="34" charset="0"/>
+              </a:rPr>
+              <a:t>© 2013 Microsoft Corporation. All rights reserved. Microsoft, Windows, and other product names are or may be registered trademarks and/or trademarks in the U.S. and/or other countries. The information herein is for informational purposes only and represents the current view of Microsoft Corporation as of the date of this presentation.  Because Microsoft must respond to changing market conditions, it should not be interpreted to be a commitment on the part of Microsoft, and Microsoft cannot guarantee the accuracy of any information provided after the date of this presentation.  MICROSOFT MAKES NO WARRANTIES, EXPRESS, IMPLIED OR STATUTORY, AS TO THE INFORMATION IN THIS PRESENTATION.</a:t>
+            </a:r>
+            <a:endParaRPr lang="en-US" sz="400" dirty="0">
+              <a:gradFill>
+                <a:gsLst>
+                  <a:gs pos="0">
+                    <a:prstClr val="black"/>
+                  </a:gs>
+                  <a:gs pos="100000">
+                    <a:prstClr val="black"/>
+                  </a:gs>
+                </a:gsLst>
+                <a:lin ang="5400000" scaled="0"/>
+              </a:gradFill>
+              <a:latin typeface="Segoe UI" pitchFamily="34" charset="0"/>
+              <a:ea typeface="Segoe UI" pitchFamily="34" charset="0"/>
+              <a:cs typeface="Segoe UI" pitchFamily="34" charset="0"/>
+            </a:endParaRPr>
+          </a:p>
+        </p:txBody>
+      </p:sp>
+      <p:sp>
+        <p:nvSpPr>
+          <p:cNvPr id="6" name="Date Placeholder 5"/>
+          <p:cNvSpPr>
+            <a:spLocks noGrp="1"/>
+          </p:cNvSpPr>
+          <p:nvPr>
+            <p:ph type="dt" idx="12"/>
+          </p:nvPr>
+        </p:nvSpPr>
+        <p:spPr/>
+        <p:txBody>
+          <a:bodyPr/>
+          <a:lstStyle/>
+          <a:p>
+            <a:fld id="{64CFA94A-519F-445C-B30C-9E76FA6A2031}" type="datetime8">
+              <a:rPr lang="en-US" smtClean="0"/>
+              <a:t>11/5/2016 3:25 PM</a:t>
+            </a:fld>
+            <a:endParaRPr lang="en-US" dirty="0"/>
+          </a:p>
+        </p:txBody>
+      </p:sp>
+      <p:sp>
+        <p:nvSpPr>
+          <p:cNvPr id="7" name="Slide Number Placeholder 6"/>
+          <p:cNvSpPr>
+            <a:spLocks noGrp="1"/>
+          </p:cNvSpPr>
+          <p:nvPr>
+            <p:ph type="sldNum" sz="quarter" idx="13"/>
+          </p:nvPr>
+        </p:nvSpPr>
+        <p:spPr/>
+        <p:txBody>
+          <a:bodyPr/>
+          <a:lstStyle/>
+          <a:p>
+            <a:fld id="{B4008EB6-D09E-4580-8CD6-DDB14511944F}" type="slidenum">
+              <a:rPr lang="en-US" smtClean="0"/>
+              <a:pPr/>
+              <a:t>20</a:t>
+            </a:fld>
+            <a:endParaRPr lang="en-US" dirty="0"/>
+          </a:p>
+        </p:txBody>
+      </p:sp>
+    </p:spTree>
+    <p:extLst>
+      <p:ext uri="{BB962C8B-B14F-4D97-AF65-F5344CB8AC3E}">
+        <p14:creationId xmlns:p14="http://schemas.microsoft.com/office/powerpoint/2010/main" val="4176714948"/>
       </p:ext>
     </p:extLst>
   </p:cSld>
@@ -2531,10 +2712,9 @@
           </a:p>
           <a:p>
             <a:r>
-              <a:rPr lang="en-US" sz="2800" b="1"/>
+              <a:rPr lang="en-US" sz="2800" b="1" dirty="0"/>
               <a:t>Tiberiu Covaci</a:t>
             </a:r>
-            <a:endParaRPr lang="en-US" sz="2800" b="1" dirty="0"/>
           </a:p>
         </p:txBody>
       </p:sp>
@@ -3235,7 +3415,11 @@
             <a:graphicFrameLocks noGrp="1"/>
           </p:cNvGraphicFramePr>
           <p:nvPr>
-            <p:extLst/>
+            <p:extLst>
+              <p:ext uri="{D42A27DB-BD31-4B8C-83A1-F6EECF244321}">
+                <p14:modId xmlns:p14="http://schemas.microsoft.com/office/powerpoint/2010/main" val="3721485965"/>
+              </p:ext>
+            </p:extLst>
           </p:nvPr>
         </p:nvGraphicFramePr>
         <p:xfrm>
@@ -3313,7 +3497,7 @@
                       <a:r>
                         <a:rPr lang="en-US" sz="1300" b="0" dirty="0">
                           <a:solidFill>
-                            <a:schemeClr val="tx1"/>
+                            <a:schemeClr val="bg1"/>
                           </a:solidFill>
                         </a:rPr>
                         <a:t>Respond to questions outlined in your guide and list the answers on a flipchart.</a:t>
@@ -3402,7 +3586,7 @@
                       <a:r>
                         <a:rPr lang="en-US" sz="1300" kern="1200" baseline="0" dirty="0">
                           <a:solidFill>
-                            <a:schemeClr val="tx1"/>
+                            <a:schemeClr val="bg1"/>
                           </a:solidFill>
                           <a:latin typeface="+mn-lt"/>
                           <a:ea typeface="+mn-ea"/>
@@ -16934,7 +17118,7 @@
           <p:nvPr/>
         </p:nvPicPr>
         <p:blipFill rotWithShape="1">
-          <a:blip r:embed="rId2" cstate="print">
+          <a:blip r:embed="rId3" cstate="print">
             <a:extLst>
               <a:ext uri="{28A0092B-C50C-407E-A947-70E740481C1C}">
                 <a14:useLocalDpi xmlns:a14="http://schemas.microsoft.com/office/drawing/2010/main" val="0"/>
@@ -18510,7 +18694,7 @@
           <a:p>
             <a:r>
               <a:rPr lang="en-US" dirty="0"/>
-              <a:t>In reviewing all of Callaway’s databases, it was determined that there were three archetypical databases present:</a:t>
+              <a:t>In reviewing all of Contoso’s databases, it was determined that there were three archetypical databases present:</a:t>
             </a:r>
           </a:p>
           <a:p>
@@ -19940,9 +20124,15 @@
 <file path=customXml/itemProps3.xml><?xml version="1.0" encoding="utf-8"?>
 <ds:datastoreItem xmlns:ds="http://schemas.openxmlformats.org/officeDocument/2006/customXml" ds:itemID="{F990F116-B58F-4255-B05B-DA3808E0E5C6}">
   <ds:schemaRefs>
+    <ds:schemaRef ds:uri="http://purl.org/dc/elements/1.1/"/>
     <ds:schemaRef ds:uri="http://schemas.microsoft.com/office/2006/metadata/properties"/>
+    <ds:schemaRef ds:uri="http://purl.org/dc/terms/"/>
+    <ds:schemaRef ds:uri="http://schemas.openxmlformats.org/package/2006/metadata/core-properties"/>
+    <ds:schemaRef ds:uri="http://schemas.microsoft.com/office/2006/documentManagement/types"/>
+    <ds:schemaRef ds:uri="c58f79d2-8dd2-43f0-9a03-e1b9f874d667"/>
     <ds:schemaRef ds:uri="http://schemas.microsoft.com/office/infopath/2007/PartnerControls"/>
-    <ds:schemaRef ds:uri="c58f79d2-8dd2-43f0-9a03-e1b9f874d667"/>
+    <ds:schemaRef ds:uri="http://www.w3.org/XML/1998/namespace"/>
+    <ds:schemaRef ds:uri="http://purl.org/dc/dcmitype/"/>
   </ds:schemaRefs>
 </ds:datastoreItem>
 </file>
</xml_diff>